<commit_message>
feat: expose new hybrid chunker, update docs
Signed-off-by: Panos Vagenas <35837085+vagenas@users.noreply.github.com>
</commit_message>
<xml_diff>
--- a/docs/assets/docling_arch.pptx
+++ b/docs/assets/docling_arch.pptx
@@ -267,7 +267,7 @@
           <a:p>
             <a:fld id="{C758DCBB-BC85-1040-9E14-7511894E2BA1}" type="datetimeFigureOut">
               <a:rPr lang="en-US" smtClean="0"/>
-              <a:t>11/14/24</a:t>
+              <a:t>12/6/24</a:t>
             </a:fld>
             <a:endParaRPr lang="en-US" dirty="0"/>
           </a:p>
@@ -465,7 +465,7 @@
           <a:p>
             <a:fld id="{C758DCBB-BC85-1040-9E14-7511894E2BA1}" type="datetimeFigureOut">
               <a:rPr lang="en-US" smtClean="0"/>
-              <a:t>11/14/24</a:t>
+              <a:t>12/6/24</a:t>
             </a:fld>
             <a:endParaRPr lang="en-US" dirty="0"/>
           </a:p>
@@ -673,7 +673,7 @@
           <a:p>
             <a:fld id="{C758DCBB-BC85-1040-9E14-7511894E2BA1}" type="datetimeFigureOut">
               <a:rPr lang="en-US" smtClean="0"/>
-              <a:t>11/14/24</a:t>
+              <a:t>12/6/24</a:t>
             </a:fld>
             <a:endParaRPr lang="en-US" dirty="0"/>
           </a:p>
@@ -871,7 +871,7 @@
           <a:p>
             <a:fld id="{C758DCBB-BC85-1040-9E14-7511894E2BA1}" type="datetimeFigureOut">
               <a:rPr lang="en-US" smtClean="0"/>
-              <a:t>11/14/24</a:t>
+              <a:t>12/6/24</a:t>
             </a:fld>
             <a:endParaRPr lang="en-US" dirty="0"/>
           </a:p>
@@ -1146,7 +1146,7 @@
           <a:p>
             <a:fld id="{C758DCBB-BC85-1040-9E14-7511894E2BA1}" type="datetimeFigureOut">
               <a:rPr lang="en-US" smtClean="0"/>
-              <a:t>11/14/24</a:t>
+              <a:t>12/6/24</a:t>
             </a:fld>
             <a:endParaRPr lang="en-US" dirty="0"/>
           </a:p>
@@ -1411,7 +1411,7 @@
           <a:p>
             <a:fld id="{C758DCBB-BC85-1040-9E14-7511894E2BA1}" type="datetimeFigureOut">
               <a:rPr lang="en-US" smtClean="0"/>
-              <a:t>11/14/24</a:t>
+              <a:t>12/6/24</a:t>
             </a:fld>
             <a:endParaRPr lang="en-US" dirty="0"/>
           </a:p>
@@ -1823,7 +1823,7 @@
           <a:p>
             <a:fld id="{C758DCBB-BC85-1040-9E14-7511894E2BA1}" type="datetimeFigureOut">
               <a:rPr lang="en-US" smtClean="0"/>
-              <a:t>11/14/24</a:t>
+              <a:t>12/6/24</a:t>
             </a:fld>
             <a:endParaRPr lang="en-US" dirty="0"/>
           </a:p>
@@ -1964,7 +1964,7 @@
           <a:p>
             <a:fld id="{C758DCBB-BC85-1040-9E14-7511894E2BA1}" type="datetimeFigureOut">
               <a:rPr lang="en-US" smtClean="0"/>
-              <a:t>11/14/24</a:t>
+              <a:t>12/6/24</a:t>
             </a:fld>
             <a:endParaRPr lang="en-US" dirty="0"/>
           </a:p>
@@ -2077,7 +2077,7 @@
           <a:p>
             <a:fld id="{C758DCBB-BC85-1040-9E14-7511894E2BA1}" type="datetimeFigureOut">
               <a:rPr lang="en-US" smtClean="0"/>
-              <a:t>11/14/24</a:t>
+              <a:t>12/6/24</a:t>
             </a:fld>
             <a:endParaRPr lang="en-US" dirty="0"/>
           </a:p>
@@ -2388,7 +2388,7 @@
           <a:p>
             <a:fld id="{C758DCBB-BC85-1040-9E14-7511894E2BA1}" type="datetimeFigureOut">
               <a:rPr lang="en-US" smtClean="0"/>
-              <a:t>11/14/24</a:t>
+              <a:t>12/6/24</a:t>
             </a:fld>
             <a:endParaRPr lang="en-US" dirty="0"/>
           </a:p>
@@ -2676,7 +2676,7 @@
           <a:p>
             <a:fld id="{C758DCBB-BC85-1040-9E14-7511894E2BA1}" type="datetimeFigureOut">
               <a:rPr lang="en-US" smtClean="0"/>
-              <a:t>11/14/24</a:t>
+              <a:t>12/6/24</a:t>
             </a:fld>
             <a:endParaRPr lang="en-US" dirty="0"/>
           </a:p>
@@ -2917,7 +2917,7 @@
           <a:p>
             <a:fld id="{C758DCBB-BC85-1040-9E14-7511894E2BA1}" type="datetimeFigureOut">
               <a:rPr lang="en-US" smtClean="0"/>
-              <a:t>11/14/24</a:t>
+              <a:t>12/6/24</a:t>
             </a:fld>
             <a:endParaRPr lang="en-US" dirty="0"/>
           </a:p>
@@ -5460,6 +5460,115 @@
           </a:xfrm>
           <a:prstGeom prst="straightConnector1">
             <a:avLst/>
+          </a:prstGeom>
+          <a:ln>
+            <a:tailEnd type="triangle"/>
+          </a:ln>
+        </p:spPr>
+        <p:style>
+          <a:lnRef idx="2">
+            <a:schemeClr val="accent1"/>
+          </a:lnRef>
+          <a:fillRef idx="0">
+            <a:schemeClr val="accent1"/>
+          </a:fillRef>
+          <a:effectRef idx="1">
+            <a:schemeClr val="accent1"/>
+          </a:effectRef>
+          <a:fontRef idx="minor">
+            <a:schemeClr val="tx1"/>
+          </a:fontRef>
+        </p:style>
+      </p:cxnSp>
+      <p:sp>
+        <p:nvSpPr>
+          <p:cNvPr id="3" name="Rounded Rectangle 2">
+            <a:extLst>
+              <a:ext uri="{FF2B5EF4-FFF2-40B4-BE49-F238E27FC236}">
+                <a16:creationId xmlns:a16="http://schemas.microsoft.com/office/drawing/2014/main" id="{78C00858-1A15-7537-D58B-0EA1A369110E}"/>
+              </a:ext>
+            </a:extLst>
+          </p:cNvPr>
+          <p:cNvSpPr/>
+          <p:nvPr/>
+        </p:nvSpPr>
+        <p:spPr>
+          <a:xfrm>
+            <a:off x="9024563" y="3454841"/>
+            <a:ext cx="2392113" cy="525517"/>
+          </a:xfrm>
+          <a:prstGeom prst="roundRect">
+            <a:avLst/>
+          </a:prstGeom>
+          <a:solidFill>
+            <a:schemeClr val="tx2">
+              <a:lumMod val="50000"/>
+              <a:lumOff val="50000"/>
+            </a:schemeClr>
+          </a:solidFill>
+        </p:spPr>
+        <p:style>
+          <a:lnRef idx="2">
+            <a:schemeClr val="accent1">
+              <a:shade val="15000"/>
+            </a:schemeClr>
+          </a:lnRef>
+          <a:fillRef idx="1">
+            <a:schemeClr val="accent1"/>
+          </a:fillRef>
+          <a:effectRef idx="0">
+            <a:schemeClr val="accent1"/>
+          </a:effectRef>
+          <a:fontRef idx="minor">
+            <a:schemeClr val="lt1"/>
+          </a:fontRef>
+        </p:style>
+        <p:txBody>
+          <a:bodyPr rtlCol="0" anchor="ctr"/>
+          <a:lstStyle/>
+          <a:p>
+            <a:pPr algn="ctr"/>
+            <a:r>
+              <a:rPr lang="en-US" dirty="0" err="1">
+                <a:solidFill>
+                  <a:schemeClr val="bg1"/>
+                </a:solidFill>
+              </a:rPr>
+              <a:t>HybridChunker</a:t>
+            </a:r>
+            <a:endParaRPr lang="en-US" dirty="0">
+              <a:solidFill>
+                <a:schemeClr val="bg1"/>
+              </a:solidFill>
+            </a:endParaRPr>
+          </a:p>
+        </p:txBody>
+      </p:sp>
+      <p:cxnSp>
+        <p:nvCxnSpPr>
+          <p:cNvPr id="4" name="Elbow Connector 3">
+            <a:extLst>
+              <a:ext uri="{FF2B5EF4-FFF2-40B4-BE49-F238E27FC236}">
+                <a16:creationId xmlns:a16="http://schemas.microsoft.com/office/drawing/2014/main" id="{8D9F085B-C9FA-C23F-FEEC-62EDBB942690}"/>
+              </a:ext>
+            </a:extLst>
+          </p:cNvPr>
+          <p:cNvCxnSpPr>
+            <a:cxnSpLocks/>
+            <a:stCxn id="10" idx="3"/>
+            <a:endCxn id="3" idx="1"/>
+          </p:cNvCxnSpPr>
+          <p:nvPr/>
+        </p:nvCxnSpPr>
+        <p:spPr>
+          <a:xfrm>
+            <a:off x="8429789" y="3366694"/>
+            <a:ext cx="594774" cy="350906"/>
+          </a:xfrm>
+          <a:prstGeom prst="bentConnector3">
+            <a:avLst>
+              <a:gd name="adj1" fmla="val 50000"/>
+            </a:avLst>
           </a:prstGeom>
           <a:ln>
             <a:tailEnd type="triangle"/>

</xml_diff>

<commit_message>
feat: expose new hybrid chunker, update docs (#384)
Signed-off-by: Panos Vagenas <35837085+vagenas@users.noreply.github.com>
</commit_message>
<xml_diff>
--- a/docs/assets/docling_arch.pptx
+++ b/docs/assets/docling_arch.pptx
@@ -267,7 +267,7 @@
           <a:p>
             <a:fld id="{C758DCBB-BC85-1040-9E14-7511894E2BA1}" type="datetimeFigureOut">
               <a:rPr lang="en-US" smtClean="0"/>
-              <a:t>11/14/24</a:t>
+              <a:t>12/6/24</a:t>
             </a:fld>
             <a:endParaRPr lang="en-US" dirty="0"/>
           </a:p>
@@ -465,7 +465,7 @@
           <a:p>
             <a:fld id="{C758DCBB-BC85-1040-9E14-7511894E2BA1}" type="datetimeFigureOut">
               <a:rPr lang="en-US" smtClean="0"/>
-              <a:t>11/14/24</a:t>
+              <a:t>12/6/24</a:t>
             </a:fld>
             <a:endParaRPr lang="en-US" dirty="0"/>
           </a:p>
@@ -673,7 +673,7 @@
           <a:p>
             <a:fld id="{C758DCBB-BC85-1040-9E14-7511894E2BA1}" type="datetimeFigureOut">
               <a:rPr lang="en-US" smtClean="0"/>
-              <a:t>11/14/24</a:t>
+              <a:t>12/6/24</a:t>
             </a:fld>
             <a:endParaRPr lang="en-US" dirty="0"/>
           </a:p>
@@ -871,7 +871,7 @@
           <a:p>
             <a:fld id="{C758DCBB-BC85-1040-9E14-7511894E2BA1}" type="datetimeFigureOut">
               <a:rPr lang="en-US" smtClean="0"/>
-              <a:t>11/14/24</a:t>
+              <a:t>12/6/24</a:t>
             </a:fld>
             <a:endParaRPr lang="en-US" dirty="0"/>
           </a:p>
@@ -1146,7 +1146,7 @@
           <a:p>
             <a:fld id="{C758DCBB-BC85-1040-9E14-7511894E2BA1}" type="datetimeFigureOut">
               <a:rPr lang="en-US" smtClean="0"/>
-              <a:t>11/14/24</a:t>
+              <a:t>12/6/24</a:t>
             </a:fld>
             <a:endParaRPr lang="en-US" dirty="0"/>
           </a:p>
@@ -1411,7 +1411,7 @@
           <a:p>
             <a:fld id="{C758DCBB-BC85-1040-9E14-7511894E2BA1}" type="datetimeFigureOut">
               <a:rPr lang="en-US" smtClean="0"/>
-              <a:t>11/14/24</a:t>
+              <a:t>12/6/24</a:t>
             </a:fld>
             <a:endParaRPr lang="en-US" dirty="0"/>
           </a:p>
@@ -1823,7 +1823,7 @@
           <a:p>
             <a:fld id="{C758DCBB-BC85-1040-9E14-7511894E2BA1}" type="datetimeFigureOut">
               <a:rPr lang="en-US" smtClean="0"/>
-              <a:t>11/14/24</a:t>
+              <a:t>12/6/24</a:t>
             </a:fld>
             <a:endParaRPr lang="en-US" dirty="0"/>
           </a:p>
@@ -1964,7 +1964,7 @@
           <a:p>
             <a:fld id="{C758DCBB-BC85-1040-9E14-7511894E2BA1}" type="datetimeFigureOut">
               <a:rPr lang="en-US" smtClean="0"/>
-              <a:t>11/14/24</a:t>
+              <a:t>12/6/24</a:t>
             </a:fld>
             <a:endParaRPr lang="en-US" dirty="0"/>
           </a:p>
@@ -2077,7 +2077,7 @@
           <a:p>
             <a:fld id="{C758DCBB-BC85-1040-9E14-7511894E2BA1}" type="datetimeFigureOut">
               <a:rPr lang="en-US" smtClean="0"/>
-              <a:t>11/14/24</a:t>
+              <a:t>12/6/24</a:t>
             </a:fld>
             <a:endParaRPr lang="en-US" dirty="0"/>
           </a:p>
@@ -2388,7 +2388,7 @@
           <a:p>
             <a:fld id="{C758DCBB-BC85-1040-9E14-7511894E2BA1}" type="datetimeFigureOut">
               <a:rPr lang="en-US" smtClean="0"/>
-              <a:t>11/14/24</a:t>
+              <a:t>12/6/24</a:t>
             </a:fld>
             <a:endParaRPr lang="en-US" dirty="0"/>
           </a:p>
@@ -2676,7 +2676,7 @@
           <a:p>
             <a:fld id="{C758DCBB-BC85-1040-9E14-7511894E2BA1}" type="datetimeFigureOut">
               <a:rPr lang="en-US" smtClean="0"/>
-              <a:t>11/14/24</a:t>
+              <a:t>12/6/24</a:t>
             </a:fld>
             <a:endParaRPr lang="en-US" dirty="0"/>
           </a:p>
@@ -2917,7 +2917,7 @@
           <a:p>
             <a:fld id="{C758DCBB-BC85-1040-9E14-7511894E2BA1}" type="datetimeFigureOut">
               <a:rPr lang="en-US" smtClean="0"/>
-              <a:t>11/14/24</a:t>
+              <a:t>12/6/24</a:t>
             </a:fld>
             <a:endParaRPr lang="en-US" dirty="0"/>
           </a:p>
@@ -5460,6 +5460,115 @@
           </a:xfrm>
           <a:prstGeom prst="straightConnector1">
             <a:avLst/>
+          </a:prstGeom>
+          <a:ln>
+            <a:tailEnd type="triangle"/>
+          </a:ln>
+        </p:spPr>
+        <p:style>
+          <a:lnRef idx="2">
+            <a:schemeClr val="accent1"/>
+          </a:lnRef>
+          <a:fillRef idx="0">
+            <a:schemeClr val="accent1"/>
+          </a:fillRef>
+          <a:effectRef idx="1">
+            <a:schemeClr val="accent1"/>
+          </a:effectRef>
+          <a:fontRef idx="minor">
+            <a:schemeClr val="tx1"/>
+          </a:fontRef>
+        </p:style>
+      </p:cxnSp>
+      <p:sp>
+        <p:nvSpPr>
+          <p:cNvPr id="3" name="Rounded Rectangle 2">
+            <a:extLst>
+              <a:ext uri="{FF2B5EF4-FFF2-40B4-BE49-F238E27FC236}">
+                <a16:creationId xmlns:a16="http://schemas.microsoft.com/office/drawing/2014/main" id="{78C00858-1A15-7537-D58B-0EA1A369110E}"/>
+              </a:ext>
+            </a:extLst>
+          </p:cNvPr>
+          <p:cNvSpPr/>
+          <p:nvPr/>
+        </p:nvSpPr>
+        <p:spPr>
+          <a:xfrm>
+            <a:off x="9024563" y="3454841"/>
+            <a:ext cx="2392113" cy="525517"/>
+          </a:xfrm>
+          <a:prstGeom prst="roundRect">
+            <a:avLst/>
+          </a:prstGeom>
+          <a:solidFill>
+            <a:schemeClr val="tx2">
+              <a:lumMod val="50000"/>
+              <a:lumOff val="50000"/>
+            </a:schemeClr>
+          </a:solidFill>
+        </p:spPr>
+        <p:style>
+          <a:lnRef idx="2">
+            <a:schemeClr val="accent1">
+              <a:shade val="15000"/>
+            </a:schemeClr>
+          </a:lnRef>
+          <a:fillRef idx="1">
+            <a:schemeClr val="accent1"/>
+          </a:fillRef>
+          <a:effectRef idx="0">
+            <a:schemeClr val="accent1"/>
+          </a:effectRef>
+          <a:fontRef idx="minor">
+            <a:schemeClr val="lt1"/>
+          </a:fontRef>
+        </p:style>
+        <p:txBody>
+          <a:bodyPr rtlCol="0" anchor="ctr"/>
+          <a:lstStyle/>
+          <a:p>
+            <a:pPr algn="ctr"/>
+            <a:r>
+              <a:rPr lang="en-US" dirty="0" err="1">
+                <a:solidFill>
+                  <a:schemeClr val="bg1"/>
+                </a:solidFill>
+              </a:rPr>
+              <a:t>HybridChunker</a:t>
+            </a:r>
+            <a:endParaRPr lang="en-US" dirty="0">
+              <a:solidFill>
+                <a:schemeClr val="bg1"/>
+              </a:solidFill>
+            </a:endParaRPr>
+          </a:p>
+        </p:txBody>
+      </p:sp>
+      <p:cxnSp>
+        <p:nvCxnSpPr>
+          <p:cNvPr id="4" name="Elbow Connector 3">
+            <a:extLst>
+              <a:ext uri="{FF2B5EF4-FFF2-40B4-BE49-F238E27FC236}">
+                <a16:creationId xmlns:a16="http://schemas.microsoft.com/office/drawing/2014/main" id="{8D9F085B-C9FA-C23F-FEEC-62EDBB942690}"/>
+              </a:ext>
+            </a:extLst>
+          </p:cNvPr>
+          <p:cNvCxnSpPr>
+            <a:cxnSpLocks/>
+            <a:stCxn id="10" idx="3"/>
+            <a:endCxn id="3" idx="1"/>
+          </p:cNvCxnSpPr>
+          <p:nvPr/>
+        </p:nvCxnSpPr>
+        <p:spPr>
+          <a:xfrm>
+            <a:off x="8429789" y="3366694"/>
+            <a:ext cx="594774" cy="350906"/>
+          </a:xfrm>
+          <a:prstGeom prst="bentConnector3">
+            <a:avLst>
+              <a:gd name="adj1" fmla="val 50000"/>
+            </a:avLst>
           </a:prstGeom>
           <a:ln>
             <a:tailEnd type="triangle"/>

</xml_diff>